<commit_message>
minor fix for dg add command
</commit_message>
<xml_diff>
--- a/docs/slides/AddItem.pptx
+++ b/docs/slides/AddItem.pptx
@@ -262,7 +262,7 @@
           <a:p>
             <a:fld id="{D0611CAC-3318-4498-9BF9-6151DB04C0E7}" type="datetimeFigureOut">
               <a:rPr lang="en-SG" smtClean="0"/>
-              <a:t>5/4/2020</a:t>
+              <a:t>9/4/2020</a:t>
             </a:fld>
             <a:endParaRPr lang="en-SG"/>
           </a:p>
@@ -462,7 +462,7 @@
           <a:p>
             <a:fld id="{D0611CAC-3318-4498-9BF9-6151DB04C0E7}" type="datetimeFigureOut">
               <a:rPr lang="en-SG" smtClean="0"/>
-              <a:t>5/4/2020</a:t>
+              <a:t>9/4/2020</a:t>
             </a:fld>
             <a:endParaRPr lang="en-SG"/>
           </a:p>
@@ -672,7 +672,7 @@
           <a:p>
             <a:fld id="{D0611CAC-3318-4498-9BF9-6151DB04C0E7}" type="datetimeFigureOut">
               <a:rPr lang="en-SG" smtClean="0"/>
-              <a:t>5/4/2020</a:t>
+              <a:t>9/4/2020</a:t>
             </a:fld>
             <a:endParaRPr lang="en-SG"/>
           </a:p>
@@ -872,7 +872,7 @@
           <a:p>
             <a:fld id="{D0611CAC-3318-4498-9BF9-6151DB04C0E7}" type="datetimeFigureOut">
               <a:rPr lang="en-SG" smtClean="0"/>
-              <a:t>5/4/2020</a:t>
+              <a:t>9/4/2020</a:t>
             </a:fld>
             <a:endParaRPr lang="en-SG"/>
           </a:p>
@@ -1148,7 +1148,7 @@
           <a:p>
             <a:fld id="{D0611CAC-3318-4498-9BF9-6151DB04C0E7}" type="datetimeFigureOut">
               <a:rPr lang="en-SG" smtClean="0"/>
-              <a:t>5/4/2020</a:t>
+              <a:t>9/4/2020</a:t>
             </a:fld>
             <a:endParaRPr lang="en-SG"/>
           </a:p>
@@ -1416,7 +1416,7 @@
           <a:p>
             <a:fld id="{D0611CAC-3318-4498-9BF9-6151DB04C0E7}" type="datetimeFigureOut">
               <a:rPr lang="en-SG" smtClean="0"/>
-              <a:t>5/4/2020</a:t>
+              <a:t>9/4/2020</a:t>
             </a:fld>
             <a:endParaRPr lang="en-SG"/>
           </a:p>
@@ -1831,7 +1831,7 @@
           <a:p>
             <a:fld id="{D0611CAC-3318-4498-9BF9-6151DB04C0E7}" type="datetimeFigureOut">
               <a:rPr lang="en-SG" smtClean="0"/>
-              <a:t>5/4/2020</a:t>
+              <a:t>9/4/2020</a:t>
             </a:fld>
             <a:endParaRPr lang="en-SG"/>
           </a:p>
@@ -1973,7 +1973,7 @@
           <a:p>
             <a:fld id="{D0611CAC-3318-4498-9BF9-6151DB04C0E7}" type="datetimeFigureOut">
               <a:rPr lang="en-SG" smtClean="0"/>
-              <a:t>5/4/2020</a:t>
+              <a:t>9/4/2020</a:t>
             </a:fld>
             <a:endParaRPr lang="en-SG"/>
           </a:p>
@@ -2086,7 +2086,7 @@
           <a:p>
             <a:fld id="{D0611CAC-3318-4498-9BF9-6151DB04C0E7}" type="datetimeFigureOut">
               <a:rPr lang="en-SG" smtClean="0"/>
-              <a:t>5/4/2020</a:t>
+              <a:t>9/4/2020</a:t>
             </a:fld>
             <a:endParaRPr lang="en-SG"/>
           </a:p>
@@ -2399,7 +2399,7 @@
           <a:p>
             <a:fld id="{D0611CAC-3318-4498-9BF9-6151DB04C0E7}" type="datetimeFigureOut">
               <a:rPr lang="en-SG" smtClean="0"/>
-              <a:t>5/4/2020</a:t>
+              <a:t>9/4/2020</a:t>
             </a:fld>
             <a:endParaRPr lang="en-SG"/>
           </a:p>
@@ -2688,7 +2688,7 @@
           <a:p>
             <a:fld id="{D0611CAC-3318-4498-9BF9-6151DB04C0E7}" type="datetimeFigureOut">
               <a:rPr lang="en-SG" smtClean="0"/>
-              <a:t>5/4/2020</a:t>
+              <a:t>9/4/2020</a:t>
             </a:fld>
             <a:endParaRPr lang="en-SG"/>
           </a:p>
@@ -2931,7 +2931,7 @@
           <a:p>
             <a:fld id="{D0611CAC-3318-4498-9BF9-6151DB04C0E7}" type="datetimeFigureOut">
               <a:rPr lang="en-SG" smtClean="0"/>
-              <a:t>5/4/2020</a:t>
+              <a:t>9/4/2020</a:t>
             </a:fld>
             <a:endParaRPr lang="en-SG"/>
           </a:p>
@@ -6649,6 +6649,20 @@
                   <a:t>sd</a:t>
                 </a:r>
                 <a:r>
+                  <a:rPr kumimoji="0" lang="en-SG" sz="1800" b="0" i="0" u="none" strike="noStrike" kern="0" cap="none" spc="0" normalizeH="0" baseline="0" noProof="0">
+                    <a:ln>
+                      <a:noFill/>
+                    </a:ln>
+                    <a:solidFill>
+                      <a:prstClr val="black"/>
+                    </a:solidFill>
+                    <a:effectLst/>
+                    <a:uLnTx/>
+                    <a:uFillTx/>
+                  </a:rPr>
+                  <a:t> add </a:t>
+                </a:r>
+                <a:r>
                   <a:rPr kumimoji="0" lang="en-SG" sz="1800" b="0" i="0" u="none" strike="noStrike" kern="0" cap="none" spc="0" normalizeH="0" baseline="0" noProof="0" dirty="0">
                     <a:ln>
                       <a:noFill/>
@@ -6660,7 +6674,7 @@
                     <a:uLnTx/>
                     <a:uFillTx/>
                   </a:rPr>
-                  <a:t> Add item values</a:t>
+                  <a:t>item values</a:t>
                 </a:r>
               </a:p>
               <a:p>

</xml_diff>